<commit_message>
Rewrite main problem page and project description.
</commit_message>
<xml_diff>
--- a/docs/Exam Management System - PROPOSAL.pptx
+++ b/docs/Exam Management System - PROPOSAL.pptx
@@ -257,7 +257,7 @@
       <p15:sldGuideLst xmlns:p15="http://schemas.microsoft.com/office/powerpoint/2012/main"/>
     </p:ext>
     <p:ext uri="GoogleSlidesCustomDataVersion2">
-      <go:slidesCustomData xmlns="" xmlns:mc="http://schemas.openxmlformats.org/markup-compatibility/2006" xmlns:mv="urn:schemas-microsoft-com:mac:vml" xmlns:c="http://schemas.openxmlformats.org/drawingml/2006/chart" xmlns:dgm="http://schemas.openxmlformats.org/drawingml/2006/diagram" xmlns:o="urn:schemas-microsoft-com:office:office" xmlns:v="urn:schemas-microsoft-com:vml" xmlns:pvml="urn:schemas-microsoft-com:office:powerpoint" xmlns:com="http://schemas.openxmlformats.org/drawingml/2006/compatibility" xmlns:p14="http://schemas.microsoft.com/office/powerpoint/2010/main" xmlns:p15="http://schemas.microsoft.com/office/powerpoint/2012/main" xmlns:ahyp="http://schemas.microsoft.com/office/drawing/2018/hyperlinkcolor" xmlns:go="http://customooxmlschemas.google.com/" r:id="rId17" roundtripDataSignature="AMtx7mjHDiAdwHvLZK2bWmoRcue1Uht1hA=="/>
+      <go:slidesCustomData xmlns:go="http://customooxmlschemas.google.com/" xmlns:ahyp="http://schemas.microsoft.com/office/drawing/2018/hyperlinkcolor" xmlns:p15="http://schemas.microsoft.com/office/powerpoint/2012/main" xmlns:p14="http://schemas.microsoft.com/office/powerpoint/2010/main" xmlns:com="http://schemas.openxmlformats.org/drawingml/2006/compatibility" xmlns:pvml="urn:schemas-microsoft-com:office:powerpoint" xmlns:v="urn:schemas-microsoft-com:vml" xmlns:o="urn:schemas-microsoft-com:office:office" xmlns:dgm="http://schemas.openxmlformats.org/drawingml/2006/diagram" xmlns:c="http://schemas.openxmlformats.org/drawingml/2006/chart" xmlns:mv="urn:schemas-microsoft-com:mac:vml" xmlns:mc="http://schemas.openxmlformats.org/markup-compatibility/2006" xmlns="" r:id="rId17" roundtripDataSignature="AMtx7mjHDiAdwHvLZK2bWmoRcue1Uht1hA=="/>
     </p:ext>
   </p:extLst>
 </p:presentation>
@@ -14528,57 +14528,9 @@
         </p:spPr>
         <p:txBody>
           <a:bodyPr spcFirstLastPara="1" wrap="square" lIns="91425" tIns="45700" rIns="91425" bIns="45700" anchor="t" anchorCtr="0">
-            <a:normAutofit fontScale="92500" lnSpcReduction="10000"/>
+            <a:normAutofit fontScale="92500"/>
           </a:bodyPr>
           <a:lstStyle/>
-          <a:p>
-            <a:pPr marL="228600" lvl="0" indent="-228600" algn="l" rtl="0">
-              <a:lnSpc>
-                <a:spcPct val="90000"/>
-              </a:lnSpc>
-              <a:spcBef>
-                <a:spcPts val="0"/>
-              </a:spcBef>
-              <a:spcAft>
-                <a:spcPts val="0"/>
-              </a:spcAft>
-              <a:buClr>
-                <a:schemeClr val="dk1"/>
-              </a:buClr>
-              <a:buSzPts val="2800"/>
-              <a:buChar char="•"/>
-            </a:pPr>
-            <a:r>
-              <a:rPr lang="en-IL" dirty="0"/>
-              <a:t>What is the  motivation and purpose of the project</a:t>
-            </a:r>
-            <a:endParaRPr lang="he-IL" dirty="0"/>
-          </a:p>
-          <a:p>
-            <a:pPr marL="685800" lvl="1" indent="-228600">
-              <a:spcBef>
-                <a:spcPts val="0"/>
-              </a:spcBef>
-              <a:buSzPts val="2800"/>
-            </a:pPr>
-            <a:r>
-              <a:rPr lang="en-US" dirty="0"/>
-              <a:t>A web-based System for managing and synthesizing exams</a:t>
-            </a:r>
-          </a:p>
-          <a:p>
-            <a:pPr marL="685800" lvl="1" indent="-228600">
-              <a:spcBef>
-                <a:spcPts val="0"/>
-              </a:spcBef>
-              <a:buSzPts val="2800"/>
-            </a:pPr>
-            <a:r>
-              <a:rPr lang="en-US" dirty="0"/>
-              <a:t>Intended to replace current offline system </a:t>
-            </a:r>
-            <a:endParaRPr dirty="0"/>
-          </a:p>
           <a:p>
             <a:pPr marL="228600" lvl="0" indent="-228600" algn="l" rtl="0">
               <a:lnSpc>
@@ -14625,6 +14577,11 @@
               <a:rPr lang="en-US" dirty="0"/>
               <a:t>The creation of challenging multiple-choice tests in the sciences is a non-trivial task.</a:t>
             </a:r>
+            <a:r>
+              <a:rPr lang="he-IL" dirty="0"/>
+              <a:t> </a:t>
+            </a:r>
+            <a:endParaRPr lang="en-US" dirty="0"/>
           </a:p>
           <a:p>
             <a:pPr marL="685800" lvl="1" indent="-228600">
@@ -14635,7 +14592,19 @@
             </a:pPr>
             <a:r>
               <a:rPr lang="en-US" dirty="0"/>
-              <a:t>  </a:t>
+              <a:t>The creation of one-time-use questions is costly and unsustainable. </a:t>
+            </a:r>
+          </a:p>
+          <a:p>
+            <a:pPr marL="685800" lvl="1" indent="-228600">
+              <a:spcBef>
+                <a:spcPts val="1000"/>
+              </a:spcBef>
+              <a:buSzPts val="2800"/>
+            </a:pPr>
+            <a:r>
+              <a:rPr lang="en-US" dirty="0"/>
+              <a:t>A smarter way to utilize the TAs workforce will help create a more powerful system of exam synthesis. </a:t>
             </a:r>
           </a:p>
           <a:p>
@@ -14659,28 +14628,30 @@
               <a:rPr lang="en-IL" dirty="0"/>
               <a:t>What is the solution?</a:t>
             </a:r>
-            <a:endParaRPr dirty="0"/>
+            <a:endParaRPr lang="en-US" dirty="0"/>
           </a:p>
           <a:p>
-            <a:pPr marL="228600" lvl="0" indent="-228600" algn="l" rtl="0">
-              <a:lnSpc>
-                <a:spcPct val="90000"/>
-              </a:lnSpc>
-              <a:spcBef>
-                <a:spcPts val="1000"/>
-              </a:spcBef>
-              <a:spcAft>
-                <a:spcPts val="0"/>
-              </a:spcAft>
-              <a:buClr>
-                <a:schemeClr val="dk1"/>
-              </a:buClr>
+            <a:pPr marL="685800" lvl="1" indent="-228600">
+              <a:spcBef>
+                <a:spcPts val="0"/>
+              </a:spcBef>
               <a:buSzPts val="2800"/>
-              <a:buChar char="•"/>
             </a:pPr>
             <a:r>
-              <a:rPr lang="en-IL" dirty="0"/>
-              <a:t>How will you evaluate the solution?</a:t>
+              <a:rPr lang="en-US" dirty="0"/>
+              <a:t>A web-based System for managing and synthesizing exams</a:t>
+            </a:r>
+          </a:p>
+          <a:p>
+            <a:pPr marL="685800" lvl="1" indent="-228600">
+              <a:spcBef>
+                <a:spcPts val="0"/>
+              </a:spcBef>
+              <a:buSzPts val="2800"/>
+            </a:pPr>
+            <a:r>
+              <a:rPr lang="en-US" dirty="0"/>
+              <a:t>Intended to replace current offline system. </a:t>
             </a:r>
             <a:endParaRPr dirty="0"/>
           </a:p>
@@ -14840,6 +14811,27 @@
               <a:t>The existing system has now been in use for 6-7 years in a large number of courses. </a:t>
             </a:r>
           </a:p>
+          <a:p>
+            <a:pPr marL="228600" indent="-228600">
+              <a:spcBef>
+                <a:spcPts val="0"/>
+              </a:spcBef>
+              <a:buSzPts val="2800"/>
+            </a:pPr>
+            <a:endParaRPr lang="en-US" dirty="0"/>
+          </a:p>
+          <a:p>
+            <a:pPr marL="228600" indent="-228600">
+              <a:spcBef>
+                <a:spcPts val="0"/>
+              </a:spcBef>
+              <a:buSzPts val="2800"/>
+            </a:pPr>
+            <a:r>
+              <a:rPr lang="en-US" dirty="0"/>
+              <a:t>Current system’s low accessibility is too hard for people without deep knowledge and understanding to use comfortably. </a:t>
+            </a:r>
+          </a:p>
         </p:txBody>
       </p:sp>
     </p:spTree>
@@ -14974,7 +14966,7 @@
             </a:pPr>
             <a:r>
               <a:rPr lang="en-US" dirty="0"/>
-              <a:t>Have the system be web-based</a:t>
+              <a:t>Have the system be web-based.</a:t>
             </a:r>
           </a:p>
           <a:p>
@@ -15006,7 +14998,7 @@
             </a:pPr>
             <a:r>
               <a:rPr lang="en-US" dirty="0"/>
-              <a:t>Support flexible content creation</a:t>
+              <a:t>Support flexible content creation.</a:t>
             </a:r>
           </a:p>
           <a:p>
@@ -15018,7 +15010,7 @@
             </a:pPr>
             <a:r>
               <a:rPr lang="en-US" dirty="0"/>
-              <a:t>Support flexible generation of exams</a:t>
+              <a:t>Support flexible generation of exams.</a:t>
             </a:r>
           </a:p>
           <a:p>
@@ -15170,26 +15162,18 @@
               <a:buSzPts val="2800"/>
               <a:buChar char="•"/>
             </a:pPr>
-            <a:endParaRPr lang="en-US" dirty="0"/>
-          </a:p>
-          <a:p>
-            <a:pPr marL="228600" lvl="0" indent="-228600" algn="l" rtl="0">
-              <a:lnSpc>
-                <a:spcPct val="90000"/>
-              </a:lnSpc>
-              <a:spcBef>
-                <a:spcPts val="0"/>
-              </a:spcBef>
-              <a:spcAft>
-                <a:spcPts val="0"/>
-              </a:spcAft>
-              <a:buClr>
-                <a:schemeClr val="dk1"/>
-              </a:buClr>
-              <a:buSzPts val="2800"/>
-              <a:buChar char="•"/>
-            </a:pPr>
-            <a:endParaRPr lang="en-US" dirty="0"/>
+            <a:r>
+              <a:rPr lang="en-US" dirty="0"/>
+              <a:t>Project’s </a:t>
+            </a:r>
+            <a:r>
+              <a:rPr lang="en-US" dirty="0" err="1"/>
+              <a:t>frontend+backend</a:t>
+            </a:r>
+            <a:r>
+              <a:rPr lang="en-US" dirty="0"/>
+              <a:t> will be developed in JavaScript – to allow easy maintenance by the client/new developers. </a:t>
+            </a:r>
           </a:p>
           <a:p>
             <a:pPr marL="228600" lvl="0" indent="-228600" algn="l" rtl="0">
@@ -15209,18 +15193,17 @@
               <a:buChar char="•"/>
             </a:pPr>
             <a:r>
-              <a:rPr lang="en-IL" dirty="0"/>
-              <a:t>Describe the project</a:t>
+              <a:rPr lang="en-US" dirty="0"/>
+              <a:t>Intricate and intense DB work will allow maintenance of users, roles, and meta-questions.</a:t>
             </a:r>
-            <a:endParaRPr dirty="0"/>
           </a:p>
           <a:p>
-            <a:pPr marL="685800" lvl="1" indent="-228600" algn="l" rtl="0">
-              <a:lnSpc>
-                <a:spcPct val="90000"/>
-              </a:lnSpc>
-              <a:spcBef>
-                <a:spcPts val="500"/>
+            <a:pPr marL="228600" lvl="0" indent="-228600" algn="l" rtl="0">
+              <a:lnSpc>
+                <a:spcPct val="90000"/>
+              </a:lnSpc>
+              <a:spcBef>
+                <a:spcPts val="0"/>
               </a:spcBef>
               <a:spcAft>
                 <a:spcPts val="0"/>
@@ -15228,105 +15211,73 @@
               <a:buClr>
                 <a:schemeClr val="dk1"/>
               </a:buClr>
-              <a:buSzPts val="2400"/>
+              <a:buSzPts val="2800"/>
               <a:buChar char="•"/>
             </a:pPr>
             <a:r>
-              <a:rPr lang="en-IL" dirty="0"/>
-              <a:t>What will be developed?</a:t>
+              <a:rPr lang="en-US" dirty="0"/>
+              <a:t>Features will include:</a:t>
             </a:r>
-            <a:endParaRPr dirty="0"/>
           </a:p>
           <a:p>
-            <a:pPr marL="685800" lvl="1" indent="-228600" algn="l" rtl="0">
-              <a:lnSpc>
-                <a:spcPct val="90000"/>
-              </a:lnSpc>
-              <a:spcBef>
-                <a:spcPts val="500"/>
-              </a:spcBef>
-              <a:spcAft>
-                <a:spcPts val="0"/>
-              </a:spcAft>
-              <a:buClr>
-                <a:schemeClr val="dk1"/>
-              </a:buClr>
-              <a:buSzPts val="2400"/>
-              <a:buChar char="•"/>
+            <a:pPr marL="685800" lvl="1" indent="-228600">
+              <a:spcBef>
+                <a:spcPts val="0"/>
+              </a:spcBef>
+              <a:buSzPts val="2800"/>
             </a:pPr>
             <a:r>
-              <a:rPr lang="en-IL" dirty="0"/>
-              <a:t>What functionality will be? In </a:t>
+              <a:rPr lang="en-US" dirty="0"/>
+              <a:t>Maintenance of meta-questions per subject/course. </a:t>
             </a:r>
-            <a:r>
-              <a:rPr lang="en-IL" dirty="0" err="1"/>
-              <a:t>highlevel</a:t>
-            </a:r>
-            <a:endParaRPr dirty="0"/>
           </a:p>
           <a:p>
-            <a:pPr marL="685800" lvl="1" indent="-228600" algn="l" rtl="0">
-              <a:lnSpc>
-                <a:spcPct val="90000"/>
-              </a:lnSpc>
-              <a:spcBef>
-                <a:spcPts val="500"/>
-              </a:spcBef>
-              <a:spcAft>
-                <a:spcPts val="0"/>
-              </a:spcAft>
-              <a:buClr>
-                <a:schemeClr val="dk1"/>
-              </a:buClr>
-              <a:buSzPts val="2400"/>
-              <a:buChar char="•"/>
+            <a:pPr marL="685800" lvl="1" indent="-228600">
+              <a:spcBef>
+                <a:spcPts val="0"/>
+              </a:spcBef>
+              <a:buSzPts val="2800"/>
             </a:pPr>
             <a:r>
-              <a:rPr lang="en-IL" dirty="0"/>
-              <a:t>..</a:t>
+              <a:rPr lang="en-US" dirty="0"/>
+              <a:t>Maintenance of questions, possible answers, possible distractors. </a:t>
             </a:r>
-            <a:endParaRPr dirty="0"/>
           </a:p>
           <a:p>
-            <a:pPr marL="685800" lvl="1" indent="-228600" algn="l" rtl="0">
-              <a:lnSpc>
-                <a:spcPct val="90000"/>
-              </a:lnSpc>
-              <a:spcBef>
-                <a:spcPts val="500"/>
-              </a:spcBef>
-              <a:spcAft>
-                <a:spcPts val="0"/>
-              </a:spcAft>
-              <a:buClr>
-                <a:schemeClr val="dk1"/>
-              </a:buClr>
-              <a:buSzPts val="2400"/>
-              <a:buChar char="•"/>
+            <a:pPr marL="685800" lvl="1" indent="-228600">
+              <a:spcBef>
+                <a:spcPts val="0"/>
+              </a:spcBef>
+              <a:buSzPts val="2800"/>
             </a:pPr>
             <a:r>
-              <a:rPr lang="en-IL" dirty="0"/>
-              <a:t>Elaborate as much as possible – but in short items</a:t>
+              <a:rPr lang="en-US" dirty="0"/>
+              <a:t>Production of LaTeX documents for printable test files. </a:t>
             </a:r>
-            <a:endParaRPr dirty="0"/>
           </a:p>
           <a:p>
-            <a:pPr marL="685800" lvl="1" indent="-76200" algn="l" rtl="0">
-              <a:lnSpc>
-                <a:spcPct val="90000"/>
-              </a:lnSpc>
-              <a:spcBef>
-                <a:spcPts val="500"/>
-              </a:spcBef>
-              <a:spcAft>
-                <a:spcPts val="0"/>
-              </a:spcAft>
-              <a:buClr>
-                <a:schemeClr val="dk1"/>
-              </a:buClr>
-              <a:buSzPts val="2400"/>
-              <a:buNone/>
+            <a:pPr marL="685800" lvl="1" indent="-228600">
+              <a:spcBef>
+                <a:spcPts val="0"/>
+              </a:spcBef>
+              <a:buSzPts val="2800"/>
             </a:pPr>
+            <a:r>
+              <a:rPr lang="en-US" dirty="0"/>
+              <a:t>Production of statistics for questions based on test performance. </a:t>
+            </a:r>
+          </a:p>
+          <a:p>
+            <a:pPr marL="685800" lvl="1" indent="-228600">
+              <a:spcBef>
+                <a:spcPts val="0"/>
+              </a:spcBef>
+              <a:buSzPts val="2800"/>
+            </a:pPr>
+            <a:r>
+              <a:rPr lang="en-US" dirty="0"/>
+              <a:t>Role maintenance system that’ll allow division of labor and tracking. </a:t>
+            </a:r>
             <a:endParaRPr dirty="0"/>
           </a:p>
           <a:p>

</xml_diff>

<commit_message>
updated after 2nd meeting with client
</commit_message>
<xml_diff>
--- a/docs/Exam Management System - PROPOSAL.pptx
+++ b/docs/Exam Management System - PROPOSAL.pptx
@@ -14395,29 +14395,6 @@
             </a:r>
             <a:endParaRPr dirty="0"/>
           </a:p>
-          <a:p>
-            <a:pPr marL="685800" lvl="1" indent="-228600" algn="l" rtl="0">
-              <a:lnSpc>
-                <a:spcPct val="90000"/>
-              </a:lnSpc>
-              <a:spcBef>
-                <a:spcPts val="500"/>
-              </a:spcBef>
-              <a:spcAft>
-                <a:spcPts val="0"/>
-              </a:spcAft>
-              <a:buClr>
-                <a:schemeClr val="dk1"/>
-              </a:buClr>
-              <a:buSzPts val="2400"/>
-              <a:buChar char="•"/>
-            </a:pPr>
-            <a:r>
-              <a:rPr lang="en-IL" dirty="0"/>
-              <a:t>Address</a:t>
-            </a:r>
-            <a:endParaRPr dirty="0"/>
-          </a:p>
         </p:txBody>
       </p:sp>
     </p:spTree>
@@ -14492,14 +14469,14 @@
               <a:buNone/>
             </a:pPr>
             <a:r>
-              <a:rPr lang="en-IL">
+              <a:rPr lang="en-IL" dirty="0">
                 <a:solidFill>
                   <a:schemeClr val="accent4"/>
                 </a:solidFill>
               </a:rPr>
               <a:t>Project’s Motivation and Purpose</a:t>
             </a:r>
-            <a:endParaRPr/>
+            <a:endParaRPr dirty="0"/>
           </a:p>
         </p:txBody>
       </p:sp>
@@ -14515,8 +14492,8 @@
         </p:nvSpPr>
         <p:spPr>
           <a:xfrm>
-            <a:off x="838200" y="1825625"/>
-            <a:ext cx="10515600" cy="4351338"/>
+            <a:off x="838200" y="1825624"/>
+            <a:ext cx="10515600" cy="4797117"/>
           </a:xfrm>
           <a:prstGeom prst="rect">
             <a:avLst/>
@@ -14528,7 +14505,7 @@
         </p:spPr>
         <p:txBody>
           <a:bodyPr spcFirstLastPara="1" wrap="square" lIns="91425" tIns="45700" rIns="91425" bIns="45700" anchor="t" anchorCtr="0">
-            <a:normAutofit fontScale="92500"/>
+            <a:normAutofit fontScale="92500" lnSpcReduction="20000"/>
           </a:bodyPr>
           <a:lstStyle/>
           <a:p>
@@ -14549,10 +14526,9 @@
               <a:buChar char="•"/>
             </a:pPr>
             <a:r>
-              <a:rPr lang="en-IL" dirty="0"/>
-              <a:t>What problem does it  intend to solve?</a:t>
+              <a:rPr lang="en-US" dirty="0"/>
+              <a:t>General Problem:</a:t>
             </a:r>
-            <a:endParaRPr lang="en-US" dirty="0"/>
           </a:p>
           <a:p>
             <a:pPr marL="685800" lvl="1" indent="-228600">
@@ -14596,15 +14572,48 @@
             </a:r>
           </a:p>
           <a:p>
-            <a:pPr marL="685800" lvl="1" indent="-228600">
-              <a:spcBef>
-                <a:spcPts val="1000"/>
-              </a:spcBef>
+            <a:pPr marL="228600" indent="-228600">
               <a:buSzPts val="2800"/>
             </a:pPr>
             <a:r>
               <a:rPr lang="en-US" dirty="0"/>
-              <a:t>A smarter way to utilize the TAs workforce will help create a more powerful system of exam synthesis. </a:t>
+              <a:t>Specific Problem:</a:t>
+            </a:r>
+          </a:p>
+          <a:p>
+            <a:pPr marL="685800" lvl="1" indent="-228600">
+              <a:buSzPts val="2800"/>
+            </a:pPr>
+            <a:r>
+              <a:rPr lang="en-US" dirty="0"/>
+              <a:t>Maintenance of a large and growing pool of questions is proving to be difficult.</a:t>
+            </a:r>
+          </a:p>
+          <a:p>
+            <a:pPr marL="685800" lvl="1" indent="-228600">
+              <a:buSzPts val="2800"/>
+            </a:pPr>
+            <a:r>
+              <a:rPr lang="en-US" dirty="0"/>
+              <a:t>Current implemented system is local, inaccessible and hard to learn. </a:t>
+            </a:r>
+          </a:p>
+          <a:p>
+            <a:pPr marL="685800" lvl="1" indent="-228600">
+              <a:buSzPts val="2800"/>
+            </a:pPr>
+            <a:r>
+              <a:rPr lang="en-US" dirty="0"/>
+              <a:t>Division of labor between TAs and test examiners is done by hand and is hard to track.</a:t>
+            </a:r>
+          </a:p>
+          <a:p>
+            <a:pPr marL="685800" lvl="1" indent="-228600">
+              <a:buSzPts val="2800"/>
+            </a:pPr>
+            <a:r>
+              <a:rPr lang="en-US" dirty="0"/>
+              <a:t>The possibility of tracking quality of questions &amp; answers is crucially needed. </a:t>
             </a:r>
           </a:p>
           <a:p>
@@ -14639,7 +14648,7 @@
             </a:pPr>
             <a:r>
               <a:rPr lang="en-US" dirty="0"/>
-              <a:t>A web-based System for managing and synthesizing exams</a:t>
+              <a:t>A web-based System for managing work, subjects, questions.</a:t>
             </a:r>
           </a:p>
           <a:p>
@@ -14942,7 +14951,7 @@
         </p:spPr>
         <p:txBody>
           <a:bodyPr spcFirstLastPara="1" wrap="square" lIns="91425" tIns="45700" rIns="91425" bIns="45700" anchor="t" anchorCtr="0">
-            <a:normAutofit/>
+            <a:normAutofit fontScale="85000" lnSpcReduction="20000"/>
           </a:bodyPr>
           <a:lstStyle/>
           <a:p>
@@ -14954,23 +14963,11 @@
             </a:pPr>
             <a:r>
               <a:rPr lang="en-US" dirty="0"/>
-              <a:t>The system is in serious need of redesign and reimplementation to support many additional functions. </a:t>
+              <a:t>Workflow Management System:</a:t>
             </a:r>
           </a:p>
           <a:p>
-            <a:pPr marL="228600" indent="-228600">
-              <a:spcBef>
-                <a:spcPts val="0"/>
-              </a:spcBef>
-              <a:buSzPts val="2800"/>
-            </a:pPr>
-            <a:r>
-              <a:rPr lang="en-US" dirty="0"/>
-              <a:t>Have the system be web-based.</a:t>
-            </a:r>
-          </a:p>
-          <a:p>
-            <a:pPr marL="228600" indent="-228600">
+            <a:pPr marL="685800" lvl="1" indent="-228600">
               <a:spcBef>
                 <a:spcPts val="0"/>
               </a:spcBef>
@@ -14986,7 +14983,51 @@
             </a:r>
             <a:r>
               <a:rPr lang="en-US" dirty="0"/>
-              <a:t>)</a:t>
+              <a:t>).</a:t>
+            </a:r>
+          </a:p>
+          <a:p>
+            <a:pPr marL="685800" lvl="1" indent="-228600">
+              <a:spcBef>
+                <a:spcPts val="0"/>
+              </a:spcBef>
+              <a:buSzPts val="2800"/>
+            </a:pPr>
+            <a:r>
+              <a:rPr lang="en-US" dirty="0" err="1"/>
+              <a:t>Manual+Algorithmical</a:t>
+            </a:r>
+            <a:r>
+              <a:rPr lang="en-US" dirty="0"/>
+              <a:t> generation of tasks based on priority and needs.</a:t>
+            </a:r>
+          </a:p>
+          <a:p>
+            <a:pPr marL="685800" lvl="1" indent="-228600">
+              <a:spcBef>
+                <a:spcPts val="0"/>
+              </a:spcBef>
+              <a:buSzPts val="2800"/>
+            </a:pPr>
+            <a:r>
+              <a:rPr lang="en-US" dirty="0" err="1"/>
+              <a:t>Manual+Algorithmical</a:t>
+            </a:r>
+            <a:r>
+              <a:rPr lang="en-US" dirty="0"/>
+              <a:t> spread of tasks throughout configured workforce. </a:t>
+            </a:r>
+          </a:p>
+          <a:p>
+            <a:pPr marL="685800" lvl="1" indent="-228600">
+              <a:spcBef>
+                <a:spcPts val="0"/>
+              </a:spcBef>
+              <a:buSzPts val="2800"/>
+            </a:pPr>
+            <a:r>
+              <a:rPr lang="en-US" dirty="0"/>
+              <a:t>Tracking over work velocity and output (= blame feature). </a:t>
             </a:r>
           </a:p>
           <a:p>
@@ -14998,7 +15039,31 @@
             </a:pPr>
             <a:r>
               <a:rPr lang="en-US" dirty="0"/>
-              <a:t>Support flexible content creation.</a:t>
+              <a:t>UI:</a:t>
+            </a:r>
+          </a:p>
+          <a:p>
+            <a:pPr marL="685800" lvl="1" indent="-228600">
+              <a:spcBef>
+                <a:spcPts val="0"/>
+              </a:spcBef>
+              <a:buSzPts val="2800"/>
+            </a:pPr>
+            <a:r>
+              <a:rPr lang="en-US" dirty="0"/>
+              <a:t>Web-based system.</a:t>
+            </a:r>
+          </a:p>
+          <a:p>
+            <a:pPr marL="685800" lvl="1" indent="-228600">
+              <a:spcBef>
+                <a:spcPts val="0"/>
+              </a:spcBef>
+              <a:buSzPts val="2800"/>
+            </a:pPr>
+            <a:r>
+              <a:rPr lang="en-US" dirty="0"/>
+              <a:t>Dashboard based on Role.</a:t>
             </a:r>
           </a:p>
           <a:p>
@@ -15010,8 +15075,125 @@
             </a:pPr>
             <a:r>
               <a:rPr lang="en-US" dirty="0"/>
-              <a:t>Support flexible generation of exams.</a:t>
+              <a:t>Content creation:</a:t>
             </a:r>
+          </a:p>
+          <a:p>
+            <a:pPr marL="685800" lvl="1" indent="-228600">
+              <a:spcBef>
+                <a:spcPts val="0"/>
+              </a:spcBef>
+              <a:buSzPts val="2800"/>
+            </a:pPr>
+            <a:r>
+              <a:rPr lang="en-US" dirty="0"/>
+              <a:t>Manage content by subjects/keywords/classes.</a:t>
+            </a:r>
+          </a:p>
+          <a:p>
+            <a:pPr marL="685800" lvl="1" indent="-228600">
+              <a:spcBef>
+                <a:spcPts val="0"/>
+              </a:spcBef>
+              <a:buSzPts val="2800"/>
+            </a:pPr>
+            <a:r>
+              <a:rPr lang="en-US" dirty="0"/>
+              <a:t>Creation and management of stems, meta-questions, questions, appendices. </a:t>
+            </a:r>
+          </a:p>
+          <a:p>
+            <a:pPr marL="685800" lvl="1" indent="-228600">
+              <a:spcBef>
+                <a:spcPts val="0"/>
+              </a:spcBef>
+              <a:buSzPts val="2800"/>
+            </a:pPr>
+            <a:r>
+              <a:rPr lang="en-US" dirty="0"/>
+              <a:t>Creation and management of possible solutions/distractors per question. </a:t>
+            </a:r>
+          </a:p>
+          <a:p>
+            <a:pPr marL="228600" indent="-228600">
+              <a:spcBef>
+                <a:spcPts val="0"/>
+              </a:spcBef>
+              <a:buSzPts val="2800"/>
+            </a:pPr>
+            <a:r>
+              <a:rPr lang="en-US" dirty="0"/>
+              <a:t>Output creation:</a:t>
+            </a:r>
+          </a:p>
+          <a:p>
+            <a:pPr marL="685800" lvl="1" indent="-228600">
+              <a:spcBef>
+                <a:spcPts val="0"/>
+              </a:spcBef>
+              <a:buSzPts val="2800"/>
+            </a:pPr>
+            <a:r>
+              <a:rPr lang="en-US" dirty="0"/>
+              <a:t>Flexible LaTeX-based creation of exams/keys/solutions. </a:t>
+            </a:r>
+          </a:p>
+          <a:p>
+            <a:pPr marL="228600" indent="-228600">
+              <a:spcBef>
+                <a:spcPts val="0"/>
+              </a:spcBef>
+              <a:buSzPts val="2800"/>
+            </a:pPr>
+            <a:r>
+              <a:rPr lang="en-US" dirty="0"/>
+              <a:t>System:</a:t>
+            </a:r>
+          </a:p>
+          <a:p>
+            <a:pPr marL="685800" lvl="1" indent="-228600">
+              <a:spcBef>
+                <a:spcPts val="0"/>
+              </a:spcBef>
+              <a:buSzPts val="2800"/>
+            </a:pPr>
+            <a:r>
+              <a:rPr lang="en-US" dirty="0"/>
+              <a:t>Have both WMS and content handled in DB. </a:t>
+            </a:r>
+          </a:p>
+          <a:p>
+            <a:pPr marL="685800" lvl="1" indent="-228600">
+              <a:spcBef>
+                <a:spcPts val="0"/>
+              </a:spcBef>
+              <a:buSzPts val="2800"/>
+            </a:pPr>
+            <a:r>
+              <a:rPr lang="en-US" dirty="0"/>
+              <a:t>Version control of questions, handled in DB. </a:t>
+            </a:r>
+          </a:p>
+          <a:p>
+            <a:pPr marL="685800" lvl="1" indent="-228600">
+              <a:spcBef>
+                <a:spcPts val="0"/>
+              </a:spcBef>
+              <a:buSzPts val="2800"/>
+            </a:pPr>
+            <a:r>
+              <a:rPr lang="en-US" dirty="0"/>
+              <a:t>Easy install, migration, backup and cloning of the system. </a:t>
+            </a:r>
+          </a:p>
+          <a:p>
+            <a:pPr marL="228600" indent="-228600">
+              <a:spcBef>
+                <a:spcPts val="0"/>
+              </a:spcBef>
+              <a:buSzPts val="2800"/>
+            </a:pPr>
+            <a:endParaRPr lang="en-US" dirty="0"/>
           </a:p>
           <a:p>
             <a:pPr marL="685800" lvl="1" indent="-76200" algn="l" rtl="0">
@@ -15163,16 +15345,12 @@
               <a:buChar char="•"/>
             </a:pPr>
             <a:r>
-              <a:rPr lang="en-US" dirty="0"/>
-              <a:t>Project’s </a:t>
-            </a:r>
-            <a:r>
               <a:rPr lang="en-US" dirty="0" err="1"/>
-              <a:t>frontend+backend</a:t>
+              <a:t>Frontend+Backend</a:t>
             </a:r>
             <a:r>
               <a:rPr lang="en-US" dirty="0"/>
-              <a:t> will be developed in JavaScript – to allow easy maintenance by the client/new developers. </a:t>
+              <a:t> - developed in JavaScript as it is widely user, stable, with frameworks that allow easy implementation of features.</a:t>
             </a:r>
           </a:p>
           <a:p>
@@ -15194,7 +15372,7 @@
             </a:pPr>
             <a:r>
               <a:rPr lang="en-US" dirty="0"/>
-              <a:t>Intricate and intense DB work will allow maintenance of users, roles, and meta-questions.</a:t>
+              <a:t>Simple, intuitive and smooth interface - better UX is key for adoption by new users. </a:t>
             </a:r>
           </a:p>
           <a:p>
@@ -15216,67 +15394,29 @@
             </a:pPr>
             <a:r>
               <a:rPr lang="en-US" dirty="0"/>
-              <a:t>Features will include:</a:t>
+              <a:t>PostgreSQL based DB – stable and strong relational DB. </a:t>
             </a:r>
           </a:p>
           <a:p>
-            <a:pPr marL="685800" lvl="1" indent="-228600">
-              <a:spcBef>
-                <a:spcPts val="0"/>
-              </a:spcBef>
+            <a:pPr marL="228600" lvl="0" indent="-228600" algn="l" rtl="0">
+              <a:lnSpc>
+                <a:spcPct val="90000"/>
+              </a:lnSpc>
+              <a:spcBef>
+                <a:spcPts val="0"/>
+              </a:spcBef>
+              <a:spcAft>
+                <a:spcPts val="0"/>
+              </a:spcAft>
+              <a:buClr>
+                <a:schemeClr val="dk1"/>
+              </a:buClr>
               <a:buSzPts val="2800"/>
+              <a:buChar char="•"/>
             </a:pPr>
             <a:r>
               <a:rPr lang="en-US" dirty="0"/>
-              <a:t>Maintenance of meta-questions per subject/course. </a:t>
-            </a:r>
-          </a:p>
-          <a:p>
-            <a:pPr marL="685800" lvl="1" indent="-228600">
-              <a:spcBef>
-                <a:spcPts val="0"/>
-              </a:spcBef>
-              <a:buSzPts val="2800"/>
-            </a:pPr>
-            <a:r>
-              <a:rPr lang="en-US" dirty="0"/>
-              <a:t>Maintenance of questions, possible answers, possible distractors. </a:t>
-            </a:r>
-          </a:p>
-          <a:p>
-            <a:pPr marL="685800" lvl="1" indent="-228600">
-              <a:spcBef>
-                <a:spcPts val="0"/>
-              </a:spcBef>
-              <a:buSzPts val="2800"/>
-            </a:pPr>
-            <a:r>
-              <a:rPr lang="en-US" dirty="0"/>
-              <a:t>Production of LaTeX documents for printable test files. </a:t>
-            </a:r>
-          </a:p>
-          <a:p>
-            <a:pPr marL="685800" lvl="1" indent="-228600">
-              <a:spcBef>
-                <a:spcPts val="0"/>
-              </a:spcBef>
-              <a:buSzPts val="2800"/>
-            </a:pPr>
-            <a:r>
-              <a:rPr lang="en-US" dirty="0"/>
-              <a:t>Production of statistics for questions based on test performance. </a:t>
-            </a:r>
-          </a:p>
-          <a:p>
-            <a:pPr marL="685800" lvl="1" indent="-228600">
-              <a:spcBef>
-                <a:spcPts val="0"/>
-              </a:spcBef>
-              <a:buSzPts val="2800"/>
-            </a:pPr>
-            <a:r>
-              <a:rPr lang="en-US" dirty="0"/>
-              <a:t>Role maintenance system that’ll allow division of labor and tracking. </a:t>
+              <a:t>Features – Detailed in org file. </a:t>
             </a:r>
             <a:endParaRPr dirty="0"/>
           </a:p>
@@ -15438,7 +15578,7 @@
               <a:rPr lang="en-IL"/>
               <a:t>Describe the UI</a:t>
             </a:r>
-            <a:endParaRPr/>
+            <a:endParaRPr dirty="0"/>
           </a:p>
           <a:p>
             <a:pPr marL="228600" lvl="0" indent="-50800" algn="l" rtl="0">
@@ -15457,7 +15597,7 @@
               <a:buSzPts val="2800"/>
               <a:buNone/>
             </a:pPr>
-            <a:endParaRPr/>
+            <a:endParaRPr dirty="0"/>
           </a:p>
           <a:p>
             <a:pPr marL="228600" lvl="0" indent="-228600" algn="l" rtl="0">
@@ -15477,10 +15617,10 @@
               <a:buChar char="•"/>
             </a:pPr>
             <a:r>
-              <a:rPr lang="en-IL"/>
+              <a:rPr lang="en-IL" dirty="0"/>
               <a:t>User Study</a:t>
             </a:r>
-            <a:endParaRPr/>
+            <a:endParaRPr dirty="0"/>
           </a:p>
         </p:txBody>
       </p:sp>

</xml_diff>